<commit_message>
Lab 5 and other data
</commit_message>
<xml_diff>
--- a/Slides/Geog4300 Fa17 Lecture 11-2 Wilcoxon Normality.pptx
+++ b/Slides/Geog4300 Fa17 Lecture 11-2 Wilcoxon Normality.pptx
@@ -5,7 +5,7 @@
     <p:sldMasterId id="2147483659" r:id="rId1"/>
   </p:sldMasterIdLst>
   <p:notesMasterIdLst>
-    <p:notesMasterId r:id="rId25"/>
+    <p:notesMasterId r:id="rId28"/>
   </p:notesMasterIdLst>
   <p:sldIdLst>
     <p:sldId id="256" r:id="rId2"/>
@@ -31,23 +31,26 @@
     <p:sldId id="276" r:id="rId22"/>
     <p:sldId id="277" r:id="rId23"/>
     <p:sldId id="278" r:id="rId24"/>
+    <p:sldId id="279" r:id="rId25"/>
+    <p:sldId id="280" r:id="rId26"/>
+    <p:sldId id="281" r:id="rId27"/>
   </p:sldIdLst>
   <p:sldSz cx="9144000" cy="6858000" type="screen4x3"/>
   <p:notesSz cx="6858000" cy="9144000"/>
   <p:embeddedFontLst>
     <p:embeddedFont>
       <p:font typeface="Calibri" panose="020F0502020204030204" pitchFamily="34" charset="0"/>
-      <p:regular r:id="rId26"/>
-      <p:bold r:id="rId27"/>
-      <p:italic r:id="rId28"/>
-      <p:boldItalic r:id="rId29"/>
+      <p:regular r:id="rId29"/>
+      <p:bold r:id="rId30"/>
+      <p:italic r:id="rId31"/>
+      <p:boldItalic r:id="rId32"/>
     </p:embeddedFont>
     <p:embeddedFont>
       <p:font typeface="Gill Sans MT" panose="020B0502020104020203" pitchFamily="34" charset="0"/>
-      <p:regular r:id="rId30"/>
-      <p:bold r:id="rId31"/>
-      <p:italic r:id="rId32"/>
-      <p:boldItalic r:id="rId33"/>
+      <p:regular r:id="rId33"/>
+      <p:bold r:id="rId34"/>
+      <p:italic r:id="rId35"/>
+      <p:boldItalic r:id="rId36"/>
     </p:embeddedFont>
   </p:embeddedFontLst>
   <p:defaultTextStyle>
@@ -4099,6 +4102,573 @@
         </p:txBody>
       </p:sp>
     </p:spTree>
+  </p:cSld>
+  <p:clrMapOvr>
+    <a:masterClrMapping/>
+  </p:clrMapOvr>
+</p:notes>
+</file>
+
+<file path=ppt/notesSlides/notesSlide24.xml><?xml version="1.0" encoding="utf-8"?>
+<p:notes xmlns:a="http://schemas.openxmlformats.org/drawingml/2006/main" xmlns:r="http://schemas.openxmlformats.org/officeDocument/2006/relationships" xmlns:p="http://schemas.openxmlformats.org/presentationml/2006/main" showMasterSp="0" showMasterPhAnim="0">
+  <p:cSld>
+    <p:spTree>
+      <p:nvGrpSpPr>
+        <p:cNvPr id="1" name="Shape 304"/>
+        <p:cNvGrpSpPr/>
+        <p:nvPr/>
+      </p:nvGrpSpPr>
+      <p:grpSpPr>
+        <a:xfrm>
+          <a:off x="0" y="0"/>
+          <a:ext cx="0" cy="0"/>
+          <a:chOff x="0" y="0"/>
+          <a:chExt cx="0" cy="0"/>
+        </a:xfrm>
+      </p:grpSpPr>
+      <p:sp>
+        <p:nvSpPr>
+          <p:cNvPr id="305" name="Shape 305"/>
+          <p:cNvSpPr>
+            <a:spLocks noGrp="1" noRot="1" noChangeAspect="1"/>
+          </p:cNvSpPr>
+          <p:nvPr>
+            <p:ph type="sldImg" idx="2"/>
+          </p:nvPr>
+        </p:nvSpPr>
+        <p:spPr>
+          <a:xfrm>
+            <a:off x="1143000" y="685800"/>
+            <a:ext cx="4572000" cy="3429000"/>
+          </a:xfrm>
+          <a:custGeom>
+            <a:avLst/>
+            <a:gdLst/>
+            <a:ahLst/>
+            <a:cxnLst/>
+            <a:rect l="0" t="0" r="0" b="0"/>
+            <a:pathLst>
+              <a:path w="120000" h="120000" extrusionOk="0">
+                <a:moveTo>
+                  <a:pt x="0" y="0"/>
+                </a:moveTo>
+                <a:lnTo>
+                  <a:pt x="120000" y="0"/>
+                </a:lnTo>
+                <a:lnTo>
+                  <a:pt x="120000" y="120000"/>
+                </a:lnTo>
+                <a:lnTo>
+                  <a:pt x="0" y="120000"/>
+                </a:lnTo>
+                <a:close/>
+              </a:path>
+            </a:pathLst>
+          </a:custGeom>
+          <a:noFill/>
+          <a:ln w="12700" cap="flat" cmpd="sng">
+            <a:solidFill>
+              <a:srgbClr val="000000"/>
+            </a:solidFill>
+            <a:prstDash val="solid"/>
+            <a:round/>
+            <a:headEnd type="none" w="med" len="med"/>
+            <a:tailEnd type="none" w="med" len="med"/>
+          </a:ln>
+        </p:spPr>
+      </p:sp>
+      <p:sp>
+        <p:nvSpPr>
+          <p:cNvPr id="306" name="Shape 306"/>
+          <p:cNvSpPr txBox="1">
+            <a:spLocks noGrp="1"/>
+          </p:cNvSpPr>
+          <p:nvPr>
+            <p:ph type="body" idx="1"/>
+          </p:nvPr>
+        </p:nvSpPr>
+        <p:spPr>
+          <a:xfrm>
+            <a:off x="685800" y="4343400"/>
+            <a:ext cx="5486399" cy="4114800"/>
+          </a:xfrm>
+          <a:prstGeom prst="rect">
+            <a:avLst/>
+          </a:prstGeom>
+          <a:noFill/>
+          <a:ln>
+            <a:noFill/>
+          </a:ln>
+        </p:spPr>
+        <p:txBody>
+          <a:bodyPr lIns="91425" tIns="45700" rIns="91425" bIns="45700" anchor="t" anchorCtr="0">
+            <a:noAutofit/>
+          </a:bodyPr>
+          <a:lstStyle/>
+          <a:p>
+            <a:pPr marL="0" marR="0" lvl="0" indent="0" algn="l" rtl="0">
+              <a:spcBef>
+                <a:spcPts val="0"/>
+              </a:spcBef>
+              <a:buSzPct val="25000"/>
+              <a:buNone/>
+            </a:pPr>
+            <a:endParaRPr sz="1200" b="0" i="0" u="none" strike="noStrike" cap="none">
+              <a:solidFill>
+                <a:schemeClr val="dk1"/>
+              </a:solidFill>
+              <a:latin typeface="Calibri"/>
+              <a:ea typeface="Calibri"/>
+              <a:cs typeface="Calibri"/>
+              <a:sym typeface="Calibri"/>
+            </a:endParaRPr>
+          </a:p>
+        </p:txBody>
+      </p:sp>
+      <p:sp>
+        <p:nvSpPr>
+          <p:cNvPr id="307" name="Shape 307"/>
+          <p:cNvSpPr txBox="1">
+            <a:spLocks noGrp="1"/>
+          </p:cNvSpPr>
+          <p:nvPr>
+            <p:ph type="sldNum" idx="12"/>
+          </p:nvPr>
+        </p:nvSpPr>
+        <p:spPr>
+          <a:xfrm>
+            <a:off x="3884612" y="8685213"/>
+            <a:ext cx="2971799" cy="457200"/>
+          </a:xfrm>
+          <a:prstGeom prst="rect">
+            <a:avLst/>
+          </a:prstGeom>
+          <a:noFill/>
+          <a:ln>
+            <a:noFill/>
+          </a:ln>
+        </p:spPr>
+        <p:txBody>
+          <a:bodyPr lIns="91425" tIns="45700" rIns="91425" bIns="45700" anchor="b" anchorCtr="0">
+            <a:noAutofit/>
+          </a:bodyPr>
+          <a:lstStyle/>
+          <a:p>
+            <a:pPr marL="0" marR="0" lvl="0" indent="0" algn="r" rtl="0">
+              <a:spcBef>
+                <a:spcPts val="0"/>
+              </a:spcBef>
+              <a:buSzPct val="25000"/>
+              <a:buNone/>
+            </a:pPr>
+            <a:fld id="{00000000-1234-1234-1234-123412341234}" type="slidenum">
+              <a:rPr lang="en-US" sz="1200">
+                <a:solidFill>
+                  <a:schemeClr val="dk1"/>
+                </a:solidFill>
+                <a:latin typeface="Calibri"/>
+                <a:ea typeface="Calibri"/>
+                <a:cs typeface="Calibri"/>
+                <a:sym typeface="Calibri"/>
+              </a:rPr>
+              <a:t>24</a:t>
+            </a:fld>
+            <a:endParaRPr lang="en-US" sz="1200">
+              <a:solidFill>
+                <a:schemeClr val="dk1"/>
+              </a:solidFill>
+              <a:latin typeface="Calibri"/>
+              <a:ea typeface="Calibri"/>
+              <a:cs typeface="Calibri"/>
+              <a:sym typeface="Calibri"/>
+            </a:endParaRPr>
+          </a:p>
+        </p:txBody>
+      </p:sp>
+    </p:spTree>
+    <p:extLst>
+      <p:ext uri="{BB962C8B-B14F-4D97-AF65-F5344CB8AC3E}">
+        <p14:creationId xmlns:p14="http://schemas.microsoft.com/office/powerpoint/2010/main" val="3398350771"/>
+      </p:ext>
+    </p:extLst>
+  </p:cSld>
+  <p:clrMapOvr>
+    <a:masterClrMapping/>
+  </p:clrMapOvr>
+</p:notes>
+</file>
+
+<file path=ppt/notesSlides/notesSlide25.xml><?xml version="1.0" encoding="utf-8"?>
+<p:notes xmlns:a="http://schemas.openxmlformats.org/drawingml/2006/main" xmlns:r="http://schemas.openxmlformats.org/officeDocument/2006/relationships" xmlns:p="http://schemas.openxmlformats.org/presentationml/2006/main" showMasterSp="0" showMasterPhAnim="0">
+  <p:cSld>
+    <p:spTree>
+      <p:nvGrpSpPr>
+        <p:cNvPr id="1" name="Shape 304"/>
+        <p:cNvGrpSpPr/>
+        <p:nvPr/>
+      </p:nvGrpSpPr>
+      <p:grpSpPr>
+        <a:xfrm>
+          <a:off x="0" y="0"/>
+          <a:ext cx="0" cy="0"/>
+          <a:chOff x="0" y="0"/>
+          <a:chExt cx="0" cy="0"/>
+        </a:xfrm>
+      </p:grpSpPr>
+      <p:sp>
+        <p:nvSpPr>
+          <p:cNvPr id="305" name="Shape 305"/>
+          <p:cNvSpPr>
+            <a:spLocks noGrp="1" noRot="1" noChangeAspect="1"/>
+          </p:cNvSpPr>
+          <p:nvPr>
+            <p:ph type="sldImg" idx="2"/>
+          </p:nvPr>
+        </p:nvSpPr>
+        <p:spPr>
+          <a:xfrm>
+            <a:off x="1143000" y="685800"/>
+            <a:ext cx="4572000" cy="3429000"/>
+          </a:xfrm>
+          <a:custGeom>
+            <a:avLst/>
+            <a:gdLst/>
+            <a:ahLst/>
+            <a:cxnLst/>
+            <a:rect l="0" t="0" r="0" b="0"/>
+            <a:pathLst>
+              <a:path w="120000" h="120000" extrusionOk="0">
+                <a:moveTo>
+                  <a:pt x="0" y="0"/>
+                </a:moveTo>
+                <a:lnTo>
+                  <a:pt x="120000" y="0"/>
+                </a:lnTo>
+                <a:lnTo>
+                  <a:pt x="120000" y="120000"/>
+                </a:lnTo>
+                <a:lnTo>
+                  <a:pt x="0" y="120000"/>
+                </a:lnTo>
+                <a:close/>
+              </a:path>
+            </a:pathLst>
+          </a:custGeom>
+          <a:noFill/>
+          <a:ln w="12700" cap="flat" cmpd="sng">
+            <a:solidFill>
+              <a:srgbClr val="000000"/>
+            </a:solidFill>
+            <a:prstDash val="solid"/>
+            <a:round/>
+            <a:headEnd type="none" w="med" len="med"/>
+            <a:tailEnd type="none" w="med" len="med"/>
+          </a:ln>
+        </p:spPr>
+      </p:sp>
+      <p:sp>
+        <p:nvSpPr>
+          <p:cNvPr id="306" name="Shape 306"/>
+          <p:cNvSpPr txBox="1">
+            <a:spLocks noGrp="1"/>
+          </p:cNvSpPr>
+          <p:nvPr>
+            <p:ph type="body" idx="1"/>
+          </p:nvPr>
+        </p:nvSpPr>
+        <p:spPr>
+          <a:xfrm>
+            <a:off x="685800" y="4343400"/>
+            <a:ext cx="5486399" cy="4114800"/>
+          </a:xfrm>
+          <a:prstGeom prst="rect">
+            <a:avLst/>
+          </a:prstGeom>
+          <a:noFill/>
+          <a:ln>
+            <a:noFill/>
+          </a:ln>
+        </p:spPr>
+        <p:txBody>
+          <a:bodyPr lIns="91425" tIns="45700" rIns="91425" bIns="45700" anchor="t" anchorCtr="0">
+            <a:noAutofit/>
+          </a:bodyPr>
+          <a:lstStyle/>
+          <a:p>
+            <a:pPr marL="0" marR="0" lvl="0" indent="0" algn="l" rtl="0">
+              <a:spcBef>
+                <a:spcPts val="0"/>
+              </a:spcBef>
+              <a:buSzPct val="25000"/>
+              <a:buNone/>
+            </a:pPr>
+            <a:endParaRPr sz="1200" b="0" i="0" u="none" strike="noStrike" cap="none">
+              <a:solidFill>
+                <a:schemeClr val="dk1"/>
+              </a:solidFill>
+              <a:latin typeface="Calibri"/>
+              <a:ea typeface="Calibri"/>
+              <a:cs typeface="Calibri"/>
+              <a:sym typeface="Calibri"/>
+            </a:endParaRPr>
+          </a:p>
+        </p:txBody>
+      </p:sp>
+      <p:sp>
+        <p:nvSpPr>
+          <p:cNvPr id="307" name="Shape 307"/>
+          <p:cNvSpPr txBox="1">
+            <a:spLocks noGrp="1"/>
+          </p:cNvSpPr>
+          <p:nvPr>
+            <p:ph type="sldNum" idx="12"/>
+          </p:nvPr>
+        </p:nvSpPr>
+        <p:spPr>
+          <a:xfrm>
+            <a:off x="3884612" y="8685213"/>
+            <a:ext cx="2971799" cy="457200"/>
+          </a:xfrm>
+          <a:prstGeom prst="rect">
+            <a:avLst/>
+          </a:prstGeom>
+          <a:noFill/>
+          <a:ln>
+            <a:noFill/>
+          </a:ln>
+        </p:spPr>
+        <p:txBody>
+          <a:bodyPr lIns="91425" tIns="45700" rIns="91425" bIns="45700" anchor="b" anchorCtr="0">
+            <a:noAutofit/>
+          </a:bodyPr>
+          <a:lstStyle/>
+          <a:p>
+            <a:pPr marL="0" marR="0" lvl="0" indent="0" algn="r" rtl="0">
+              <a:spcBef>
+                <a:spcPts val="0"/>
+              </a:spcBef>
+              <a:buSzPct val="25000"/>
+              <a:buNone/>
+            </a:pPr>
+            <a:fld id="{00000000-1234-1234-1234-123412341234}" type="slidenum">
+              <a:rPr lang="en-US" sz="1200">
+                <a:solidFill>
+                  <a:schemeClr val="dk1"/>
+                </a:solidFill>
+                <a:latin typeface="Calibri"/>
+                <a:ea typeface="Calibri"/>
+                <a:cs typeface="Calibri"/>
+                <a:sym typeface="Calibri"/>
+              </a:rPr>
+              <a:t>25</a:t>
+            </a:fld>
+            <a:endParaRPr lang="en-US" sz="1200">
+              <a:solidFill>
+                <a:schemeClr val="dk1"/>
+              </a:solidFill>
+              <a:latin typeface="Calibri"/>
+              <a:ea typeface="Calibri"/>
+              <a:cs typeface="Calibri"/>
+              <a:sym typeface="Calibri"/>
+            </a:endParaRPr>
+          </a:p>
+        </p:txBody>
+      </p:sp>
+    </p:spTree>
+    <p:extLst>
+      <p:ext uri="{BB962C8B-B14F-4D97-AF65-F5344CB8AC3E}">
+        <p14:creationId xmlns:p14="http://schemas.microsoft.com/office/powerpoint/2010/main" val="3651687409"/>
+      </p:ext>
+    </p:extLst>
+  </p:cSld>
+  <p:clrMapOvr>
+    <a:masterClrMapping/>
+  </p:clrMapOvr>
+</p:notes>
+</file>
+
+<file path=ppt/notesSlides/notesSlide26.xml><?xml version="1.0" encoding="utf-8"?>
+<p:notes xmlns:a="http://schemas.openxmlformats.org/drawingml/2006/main" xmlns:r="http://schemas.openxmlformats.org/officeDocument/2006/relationships" xmlns:p="http://schemas.openxmlformats.org/presentationml/2006/main" showMasterSp="0" showMasterPhAnim="0">
+  <p:cSld>
+    <p:spTree>
+      <p:nvGrpSpPr>
+        <p:cNvPr id="1" name="Shape 304"/>
+        <p:cNvGrpSpPr/>
+        <p:nvPr/>
+      </p:nvGrpSpPr>
+      <p:grpSpPr>
+        <a:xfrm>
+          <a:off x="0" y="0"/>
+          <a:ext cx="0" cy="0"/>
+          <a:chOff x="0" y="0"/>
+          <a:chExt cx="0" cy="0"/>
+        </a:xfrm>
+      </p:grpSpPr>
+      <p:sp>
+        <p:nvSpPr>
+          <p:cNvPr id="305" name="Shape 305"/>
+          <p:cNvSpPr>
+            <a:spLocks noGrp="1" noRot="1" noChangeAspect="1"/>
+          </p:cNvSpPr>
+          <p:nvPr>
+            <p:ph type="sldImg" idx="2"/>
+          </p:nvPr>
+        </p:nvSpPr>
+        <p:spPr>
+          <a:xfrm>
+            <a:off x="1143000" y="685800"/>
+            <a:ext cx="4572000" cy="3429000"/>
+          </a:xfrm>
+          <a:custGeom>
+            <a:avLst/>
+            <a:gdLst/>
+            <a:ahLst/>
+            <a:cxnLst/>
+            <a:rect l="0" t="0" r="0" b="0"/>
+            <a:pathLst>
+              <a:path w="120000" h="120000" extrusionOk="0">
+                <a:moveTo>
+                  <a:pt x="0" y="0"/>
+                </a:moveTo>
+                <a:lnTo>
+                  <a:pt x="120000" y="0"/>
+                </a:lnTo>
+                <a:lnTo>
+                  <a:pt x="120000" y="120000"/>
+                </a:lnTo>
+                <a:lnTo>
+                  <a:pt x="0" y="120000"/>
+                </a:lnTo>
+                <a:close/>
+              </a:path>
+            </a:pathLst>
+          </a:custGeom>
+          <a:noFill/>
+          <a:ln w="12700" cap="flat" cmpd="sng">
+            <a:solidFill>
+              <a:srgbClr val="000000"/>
+            </a:solidFill>
+            <a:prstDash val="solid"/>
+            <a:round/>
+            <a:headEnd type="none" w="med" len="med"/>
+            <a:tailEnd type="none" w="med" len="med"/>
+          </a:ln>
+        </p:spPr>
+      </p:sp>
+      <p:sp>
+        <p:nvSpPr>
+          <p:cNvPr id="306" name="Shape 306"/>
+          <p:cNvSpPr txBox="1">
+            <a:spLocks noGrp="1"/>
+          </p:cNvSpPr>
+          <p:nvPr>
+            <p:ph type="body" idx="1"/>
+          </p:nvPr>
+        </p:nvSpPr>
+        <p:spPr>
+          <a:xfrm>
+            <a:off x="685800" y="4343400"/>
+            <a:ext cx="5486399" cy="4114800"/>
+          </a:xfrm>
+          <a:prstGeom prst="rect">
+            <a:avLst/>
+          </a:prstGeom>
+          <a:noFill/>
+          <a:ln>
+            <a:noFill/>
+          </a:ln>
+        </p:spPr>
+        <p:txBody>
+          <a:bodyPr lIns="91425" tIns="45700" rIns="91425" bIns="45700" anchor="t" anchorCtr="0">
+            <a:noAutofit/>
+          </a:bodyPr>
+          <a:lstStyle/>
+          <a:p>
+            <a:pPr marL="0" marR="0" lvl="0" indent="0" algn="l" rtl="0">
+              <a:spcBef>
+                <a:spcPts val="0"/>
+              </a:spcBef>
+              <a:buSzPct val="25000"/>
+              <a:buNone/>
+            </a:pPr>
+            <a:endParaRPr sz="1200" b="0" i="0" u="none" strike="noStrike" cap="none">
+              <a:solidFill>
+                <a:schemeClr val="dk1"/>
+              </a:solidFill>
+              <a:latin typeface="Calibri"/>
+              <a:ea typeface="Calibri"/>
+              <a:cs typeface="Calibri"/>
+              <a:sym typeface="Calibri"/>
+            </a:endParaRPr>
+          </a:p>
+        </p:txBody>
+      </p:sp>
+      <p:sp>
+        <p:nvSpPr>
+          <p:cNvPr id="307" name="Shape 307"/>
+          <p:cNvSpPr txBox="1">
+            <a:spLocks noGrp="1"/>
+          </p:cNvSpPr>
+          <p:nvPr>
+            <p:ph type="sldNum" idx="12"/>
+          </p:nvPr>
+        </p:nvSpPr>
+        <p:spPr>
+          <a:xfrm>
+            <a:off x="3884612" y="8685213"/>
+            <a:ext cx="2971799" cy="457200"/>
+          </a:xfrm>
+          <a:prstGeom prst="rect">
+            <a:avLst/>
+          </a:prstGeom>
+          <a:noFill/>
+          <a:ln>
+            <a:noFill/>
+          </a:ln>
+        </p:spPr>
+        <p:txBody>
+          <a:bodyPr lIns="91425" tIns="45700" rIns="91425" bIns="45700" anchor="b" anchorCtr="0">
+            <a:noAutofit/>
+          </a:bodyPr>
+          <a:lstStyle/>
+          <a:p>
+            <a:pPr marL="0" marR="0" lvl="0" indent="0" algn="r" rtl="0">
+              <a:spcBef>
+                <a:spcPts val="0"/>
+              </a:spcBef>
+              <a:buSzPct val="25000"/>
+              <a:buNone/>
+            </a:pPr>
+            <a:fld id="{00000000-1234-1234-1234-123412341234}" type="slidenum">
+              <a:rPr lang="en-US" sz="1200">
+                <a:solidFill>
+                  <a:schemeClr val="dk1"/>
+                </a:solidFill>
+                <a:latin typeface="Calibri"/>
+                <a:ea typeface="Calibri"/>
+                <a:cs typeface="Calibri"/>
+                <a:sym typeface="Calibri"/>
+              </a:rPr>
+              <a:t>26</a:t>
+            </a:fld>
+            <a:endParaRPr lang="en-US" sz="1200">
+              <a:solidFill>
+                <a:schemeClr val="dk1"/>
+              </a:solidFill>
+              <a:latin typeface="Calibri"/>
+              <a:ea typeface="Calibri"/>
+              <a:cs typeface="Calibri"/>
+              <a:sym typeface="Calibri"/>
+            </a:endParaRPr>
+          </a:p>
+        </p:txBody>
+      </p:sp>
+    </p:spTree>
+    <p:extLst>
+      <p:ext uri="{BB962C8B-B14F-4D97-AF65-F5344CB8AC3E}">
+        <p14:creationId xmlns:p14="http://schemas.microsoft.com/office/powerpoint/2010/main" val="4270590194"/>
+      </p:ext>
+    </p:extLst>
   </p:cSld>
   <p:clrMapOvr>
     <a:masterClrMapping/>
@@ -29822,6 +30392,635 @@
 </p:sld>
 </file>
 
+<file path=ppt/slides/slide24.xml><?xml version="1.0" encoding="utf-8"?>
+<p:sld xmlns:a="http://schemas.openxmlformats.org/drawingml/2006/main" xmlns:r="http://schemas.openxmlformats.org/officeDocument/2006/relationships" xmlns:p="http://schemas.openxmlformats.org/presentationml/2006/main">
+  <p:cSld>
+    <p:spTree>
+      <p:nvGrpSpPr>
+        <p:cNvPr id="1" name="Shape 308"/>
+        <p:cNvGrpSpPr/>
+        <p:nvPr/>
+      </p:nvGrpSpPr>
+      <p:grpSpPr>
+        <a:xfrm>
+          <a:off x="0" y="0"/>
+          <a:ext cx="0" cy="0"/>
+          <a:chOff x="0" y="0"/>
+          <a:chExt cx="0" cy="0"/>
+        </a:xfrm>
+      </p:grpSpPr>
+      <p:sp>
+        <p:nvSpPr>
+          <p:cNvPr id="309" name="Shape 309"/>
+          <p:cNvSpPr txBox="1"/>
+          <p:nvPr/>
+        </p:nvSpPr>
+        <p:spPr>
+          <a:xfrm>
+            <a:off x="509047" y="256095"/>
+            <a:ext cx="8634953" cy="707886"/>
+          </a:xfrm>
+          <a:prstGeom prst="rect">
+            <a:avLst/>
+          </a:prstGeom>
+          <a:noFill/>
+          <a:ln>
+            <a:noFill/>
+          </a:ln>
+        </p:spPr>
+        <p:txBody>
+          <a:bodyPr lIns="91425" tIns="45700" rIns="91425" bIns="45700" anchor="t" anchorCtr="0">
+            <a:noAutofit/>
+          </a:bodyPr>
+          <a:lstStyle/>
+          <a:p>
+            <a:pPr marL="0" marR="0" lvl="0" indent="0" algn="l" rtl="0">
+              <a:spcBef>
+                <a:spcPts val="0"/>
+              </a:spcBef>
+              <a:buSzPct val="25000"/>
+              <a:buNone/>
+            </a:pPr>
+            <a:r>
+              <a:rPr lang="en-US" sz="4000" dirty="0" smtClean="0">
+                <a:solidFill>
+                  <a:srgbClr val="FFFF66"/>
+                </a:solidFill>
+                <a:latin typeface="Gill Sans MT"/>
+                <a:ea typeface="Gill Sans MT"/>
+                <a:cs typeface="Gill Sans MT"/>
+                <a:sym typeface="Gill Sans MT"/>
+              </a:rPr>
+              <a:t>Project check in</a:t>
+            </a:r>
+          </a:p>
+          <a:p>
+            <a:pPr marL="0" marR="0" lvl="0" indent="0" algn="l" rtl="0">
+              <a:spcBef>
+                <a:spcPts val="0"/>
+              </a:spcBef>
+              <a:buSzPct val="25000"/>
+              <a:buNone/>
+            </a:pPr>
+            <a:endParaRPr lang="en-US" sz="4000" dirty="0">
+              <a:solidFill>
+                <a:srgbClr val="FFFF66"/>
+              </a:solidFill>
+              <a:latin typeface="Gill Sans MT"/>
+              <a:ea typeface="Gill Sans MT"/>
+              <a:cs typeface="Gill Sans MT"/>
+              <a:sym typeface="Gill Sans MT"/>
+            </a:endParaRPr>
+          </a:p>
+          <a:p>
+            <a:pPr marL="0" marR="0" lvl="0" indent="0" algn="l" rtl="0">
+              <a:spcBef>
+                <a:spcPts val="0"/>
+              </a:spcBef>
+              <a:buSzPct val="25000"/>
+              <a:buNone/>
+            </a:pPr>
+            <a:r>
+              <a:rPr lang="en-US" sz="4000" dirty="0" smtClean="0">
+                <a:solidFill>
+                  <a:srgbClr val="FFFF66"/>
+                </a:solidFill>
+                <a:latin typeface="Gill Sans MT"/>
+                <a:ea typeface="Gill Sans MT"/>
+                <a:cs typeface="Gill Sans MT"/>
+                <a:sym typeface="Gill Sans MT"/>
+              </a:rPr>
+              <a:t>Question: What changes do we see in election districts and gerrymandering between 1992 and 2016?</a:t>
+            </a:r>
+          </a:p>
+          <a:p>
+            <a:pPr marL="0" marR="0" lvl="0" indent="0" algn="l" rtl="0">
+              <a:spcBef>
+                <a:spcPts val="0"/>
+              </a:spcBef>
+              <a:buSzPct val="25000"/>
+              <a:buNone/>
+            </a:pPr>
+            <a:endParaRPr lang="en-US" sz="4000" dirty="0">
+              <a:solidFill>
+                <a:srgbClr val="FFFF66"/>
+              </a:solidFill>
+              <a:latin typeface="Gill Sans MT"/>
+              <a:ea typeface="Gill Sans MT"/>
+              <a:cs typeface="Gill Sans MT"/>
+              <a:sym typeface="Gill Sans MT"/>
+            </a:endParaRPr>
+          </a:p>
+          <a:p>
+            <a:pPr marL="0" marR="0" lvl="0" indent="0" algn="l" rtl="0">
+              <a:spcBef>
+                <a:spcPts val="0"/>
+              </a:spcBef>
+              <a:buSzPct val="25000"/>
+              <a:buNone/>
+            </a:pPr>
+            <a:r>
+              <a:rPr lang="en-US" sz="4000" dirty="0" smtClean="0">
+                <a:solidFill>
+                  <a:srgbClr val="FFFF66"/>
+                </a:solidFill>
+                <a:latin typeface="Gill Sans MT"/>
+                <a:ea typeface="Gill Sans MT"/>
+                <a:cs typeface="Gill Sans MT"/>
+                <a:sym typeface="Gill Sans MT"/>
+              </a:rPr>
+              <a:t>Data: Vote in U.S. </a:t>
+            </a:r>
+            <a:r>
+              <a:rPr lang="en-US" sz="4000" dirty="0" smtClean="0">
+                <a:solidFill>
+                  <a:srgbClr val="FFFF66"/>
+                </a:solidFill>
+                <a:latin typeface="Gill Sans MT"/>
+                <a:ea typeface="Gill Sans MT"/>
+                <a:cs typeface="Gill Sans MT"/>
+                <a:sym typeface="Gill Sans MT"/>
+              </a:rPr>
+              <a:t>House elections, census data</a:t>
+            </a:r>
+            <a:r>
+              <a:rPr lang="en-US" sz="4000" dirty="0" smtClean="0">
+                <a:solidFill>
+                  <a:srgbClr val="FFFF66"/>
+                </a:solidFill>
+                <a:latin typeface="Gill Sans MT"/>
+                <a:ea typeface="Gill Sans MT"/>
+                <a:cs typeface="Gill Sans MT"/>
+                <a:sym typeface="Gill Sans MT"/>
+              </a:rPr>
+              <a:t> </a:t>
+            </a:r>
+            <a:endParaRPr lang="en-US" sz="4000" dirty="0">
+              <a:solidFill>
+                <a:srgbClr val="FFFF66"/>
+              </a:solidFill>
+              <a:latin typeface="Gill Sans MT"/>
+              <a:ea typeface="Gill Sans MT"/>
+              <a:cs typeface="Gill Sans MT"/>
+              <a:sym typeface="Gill Sans MT"/>
+            </a:endParaRPr>
+          </a:p>
+        </p:txBody>
+      </p:sp>
+    </p:spTree>
+    <p:extLst>
+      <p:ext uri="{BB962C8B-B14F-4D97-AF65-F5344CB8AC3E}">
+        <p14:creationId xmlns:p14="http://schemas.microsoft.com/office/powerpoint/2010/main" val="4191504613"/>
+      </p:ext>
+    </p:extLst>
+  </p:cSld>
+  <p:clrMapOvr>
+    <a:masterClrMapping/>
+  </p:clrMapOvr>
+</p:sld>
+</file>
+
+<file path=ppt/slides/slide25.xml><?xml version="1.0" encoding="utf-8"?>
+<p:sld xmlns:a="http://schemas.openxmlformats.org/drawingml/2006/main" xmlns:r="http://schemas.openxmlformats.org/officeDocument/2006/relationships" xmlns:p="http://schemas.openxmlformats.org/presentationml/2006/main">
+  <p:cSld>
+    <p:spTree>
+      <p:nvGrpSpPr>
+        <p:cNvPr id="1" name="Shape 308"/>
+        <p:cNvGrpSpPr/>
+        <p:nvPr/>
+      </p:nvGrpSpPr>
+      <p:grpSpPr>
+        <a:xfrm>
+          <a:off x="0" y="0"/>
+          <a:ext cx="0" cy="0"/>
+          <a:chOff x="0" y="0"/>
+          <a:chExt cx="0" cy="0"/>
+        </a:xfrm>
+      </p:grpSpPr>
+      <p:sp>
+        <p:nvSpPr>
+          <p:cNvPr id="309" name="Shape 309"/>
+          <p:cNvSpPr txBox="1"/>
+          <p:nvPr/>
+        </p:nvSpPr>
+        <p:spPr>
+          <a:xfrm>
+            <a:off x="509047" y="256095"/>
+            <a:ext cx="8427563" cy="707886"/>
+          </a:xfrm>
+          <a:prstGeom prst="rect">
+            <a:avLst/>
+          </a:prstGeom>
+          <a:noFill/>
+          <a:ln>
+            <a:noFill/>
+          </a:ln>
+        </p:spPr>
+        <p:txBody>
+          <a:bodyPr lIns="91425" tIns="45700" rIns="91425" bIns="45700" anchor="t" anchorCtr="0">
+            <a:noAutofit/>
+          </a:bodyPr>
+          <a:lstStyle/>
+          <a:p>
+            <a:pPr marL="0" marR="0" lvl="0" indent="0" algn="l" rtl="0">
+              <a:spcBef>
+                <a:spcPts val="0"/>
+              </a:spcBef>
+              <a:buSzPct val="25000"/>
+              <a:buNone/>
+            </a:pPr>
+            <a:r>
+              <a:rPr lang="en-US" sz="4000" dirty="0" smtClean="0">
+                <a:solidFill>
+                  <a:srgbClr val="FFFF66"/>
+                </a:solidFill>
+                <a:latin typeface="Gill Sans MT"/>
+                <a:ea typeface="Gill Sans MT"/>
+                <a:cs typeface="Gill Sans MT"/>
+                <a:sym typeface="Gill Sans MT"/>
+              </a:rPr>
+              <a:t>Format:</a:t>
+            </a:r>
+          </a:p>
+          <a:p>
+            <a:pPr marL="0" marR="0" lvl="0" indent="0" algn="l" rtl="0">
+              <a:spcBef>
+                <a:spcPts val="0"/>
+              </a:spcBef>
+              <a:buSzPct val="25000"/>
+              <a:buNone/>
+            </a:pPr>
+            <a:endParaRPr lang="en-US" sz="4000" dirty="0" smtClean="0">
+              <a:solidFill>
+                <a:srgbClr val="FFFF66"/>
+              </a:solidFill>
+              <a:latin typeface="Gill Sans MT"/>
+              <a:ea typeface="Gill Sans MT"/>
+              <a:cs typeface="Gill Sans MT"/>
+              <a:sym typeface="Gill Sans MT"/>
+            </a:endParaRPr>
+          </a:p>
+          <a:p>
+            <a:pPr marL="0" marR="0" lvl="0" indent="0" algn="l" rtl="0">
+              <a:spcBef>
+                <a:spcPts val="0"/>
+              </a:spcBef>
+              <a:buSzPct val="25000"/>
+              <a:buNone/>
+            </a:pPr>
+            <a:r>
+              <a:rPr lang="en-US" sz="4000" dirty="0" smtClean="0">
+                <a:solidFill>
+                  <a:srgbClr val="FFFF66"/>
+                </a:solidFill>
+                <a:latin typeface="Gill Sans MT"/>
+                <a:ea typeface="Gill Sans MT"/>
+                <a:cs typeface="Gill Sans MT"/>
+                <a:sym typeface="Gill Sans MT"/>
+              </a:rPr>
+              <a:t>Descriptive stats for race, poverty, and district compactness, and election results in both years (tables and maps).</a:t>
+            </a:r>
+          </a:p>
+          <a:p>
+            <a:pPr marL="0" marR="0" lvl="0" indent="0" algn="l" rtl="0">
+              <a:spcBef>
+                <a:spcPts val="0"/>
+              </a:spcBef>
+              <a:buSzPct val="25000"/>
+              <a:buNone/>
+            </a:pPr>
+            <a:endParaRPr lang="en-US" sz="4000" dirty="0" smtClean="0">
+              <a:solidFill>
+                <a:srgbClr val="FFFF66"/>
+              </a:solidFill>
+              <a:latin typeface="Gill Sans MT"/>
+              <a:ea typeface="Gill Sans MT"/>
+              <a:cs typeface="Gill Sans MT"/>
+              <a:sym typeface="Gill Sans MT"/>
+            </a:endParaRPr>
+          </a:p>
+          <a:p>
+            <a:pPr>
+              <a:buSzPct val="25000"/>
+            </a:pPr>
+            <a:r>
+              <a:rPr lang="en-US" sz="4000" dirty="0">
+                <a:solidFill>
+                  <a:srgbClr val="FFFF66"/>
+                </a:solidFill>
+                <a:latin typeface="Gill Sans MT"/>
+                <a:ea typeface="Gill Sans MT"/>
+                <a:cs typeface="Gill Sans MT"/>
+                <a:sym typeface="Gill Sans MT"/>
+              </a:rPr>
+              <a:t>Correlation between these </a:t>
+            </a:r>
+            <a:r>
+              <a:rPr lang="en-US" sz="4000" dirty="0" smtClean="0">
+                <a:solidFill>
+                  <a:srgbClr val="FFFF66"/>
+                </a:solidFill>
+                <a:latin typeface="Gill Sans MT"/>
+                <a:ea typeface="Gill Sans MT"/>
+                <a:cs typeface="Gill Sans MT"/>
+                <a:sym typeface="Gill Sans MT"/>
+              </a:rPr>
+              <a:t>variables</a:t>
+            </a:r>
+            <a:endParaRPr lang="en-US" sz="4000" dirty="0">
+              <a:solidFill>
+                <a:srgbClr val="FFFF66"/>
+              </a:solidFill>
+              <a:latin typeface="Gill Sans MT"/>
+              <a:ea typeface="Gill Sans MT"/>
+              <a:cs typeface="Gill Sans MT"/>
+              <a:sym typeface="Gill Sans MT"/>
+            </a:endParaRPr>
+          </a:p>
+          <a:p>
+            <a:pPr marL="0" marR="0" lvl="0" indent="0" algn="l" rtl="0">
+              <a:spcBef>
+                <a:spcPts val="0"/>
+              </a:spcBef>
+              <a:buSzPct val="25000"/>
+              <a:buNone/>
+            </a:pPr>
+            <a:endParaRPr lang="en-US" sz="4000" dirty="0">
+              <a:solidFill>
+                <a:srgbClr val="FFFF66"/>
+              </a:solidFill>
+              <a:latin typeface="Gill Sans MT"/>
+              <a:ea typeface="Gill Sans MT"/>
+              <a:cs typeface="Gill Sans MT"/>
+              <a:sym typeface="Gill Sans MT"/>
+            </a:endParaRPr>
+          </a:p>
+          <a:p>
+            <a:pPr marL="0" marR="0" lvl="0" indent="0" algn="l" rtl="0">
+              <a:spcBef>
+                <a:spcPts val="0"/>
+              </a:spcBef>
+              <a:buSzPct val="25000"/>
+              <a:buNone/>
+            </a:pPr>
+            <a:r>
+              <a:rPr lang="en-US" sz="4000" dirty="0" smtClean="0">
+                <a:solidFill>
+                  <a:srgbClr val="FFFF66"/>
+                </a:solidFill>
+                <a:latin typeface="Gill Sans MT"/>
+                <a:ea typeface="Gill Sans MT"/>
+                <a:cs typeface="Gill Sans MT"/>
+                <a:sym typeface="Gill Sans MT"/>
+              </a:rPr>
+              <a:t>Compute efficiency gap in both years</a:t>
+            </a:r>
+          </a:p>
+          <a:p>
+            <a:pPr marL="0" marR="0" lvl="0" indent="0" algn="l" rtl="0">
+              <a:spcBef>
+                <a:spcPts val="0"/>
+              </a:spcBef>
+              <a:buSzPct val="25000"/>
+              <a:buNone/>
+            </a:pPr>
+            <a:endParaRPr lang="en-US" sz="4000" dirty="0">
+              <a:solidFill>
+                <a:srgbClr val="FFFF66"/>
+              </a:solidFill>
+              <a:latin typeface="Gill Sans MT"/>
+              <a:ea typeface="Gill Sans MT"/>
+              <a:cs typeface="Gill Sans MT"/>
+              <a:sym typeface="Gill Sans MT"/>
+            </a:endParaRPr>
+          </a:p>
+          <a:p>
+            <a:pPr marL="0" marR="0" lvl="0" indent="0" algn="l" rtl="0">
+              <a:spcBef>
+                <a:spcPts val="0"/>
+              </a:spcBef>
+              <a:buSzPct val="25000"/>
+              <a:buNone/>
+            </a:pPr>
+            <a:endParaRPr lang="en-US" sz="4000" dirty="0" smtClean="0">
+              <a:solidFill>
+                <a:srgbClr val="FFFF66"/>
+              </a:solidFill>
+              <a:latin typeface="Gill Sans MT"/>
+              <a:ea typeface="Gill Sans MT"/>
+              <a:cs typeface="Gill Sans MT"/>
+              <a:sym typeface="Gill Sans MT"/>
+            </a:endParaRPr>
+          </a:p>
+        </p:txBody>
+      </p:sp>
+    </p:spTree>
+    <p:extLst>
+      <p:ext uri="{BB962C8B-B14F-4D97-AF65-F5344CB8AC3E}">
+        <p14:creationId xmlns:p14="http://schemas.microsoft.com/office/powerpoint/2010/main" val="3641400742"/>
+      </p:ext>
+    </p:extLst>
+  </p:cSld>
+  <p:clrMapOvr>
+    <a:masterClrMapping/>
+  </p:clrMapOvr>
+</p:sld>
+</file>
+
+<file path=ppt/slides/slide26.xml><?xml version="1.0" encoding="utf-8"?>
+<p:sld xmlns:a="http://schemas.openxmlformats.org/drawingml/2006/main" xmlns:r="http://schemas.openxmlformats.org/officeDocument/2006/relationships" xmlns:p="http://schemas.openxmlformats.org/presentationml/2006/main">
+  <p:cSld>
+    <p:spTree>
+      <p:nvGrpSpPr>
+        <p:cNvPr id="1" name="Shape 308"/>
+        <p:cNvGrpSpPr/>
+        <p:nvPr/>
+      </p:nvGrpSpPr>
+      <p:grpSpPr>
+        <a:xfrm>
+          <a:off x="0" y="0"/>
+          <a:ext cx="0" cy="0"/>
+          <a:chOff x="0" y="0"/>
+          <a:chExt cx="0" cy="0"/>
+        </a:xfrm>
+      </p:grpSpPr>
+      <p:sp>
+        <p:nvSpPr>
+          <p:cNvPr id="309" name="Shape 309"/>
+          <p:cNvSpPr txBox="1"/>
+          <p:nvPr/>
+        </p:nvSpPr>
+        <p:spPr>
+          <a:xfrm>
+            <a:off x="509047" y="256095"/>
+            <a:ext cx="8427563" cy="707886"/>
+          </a:xfrm>
+          <a:prstGeom prst="rect">
+            <a:avLst/>
+          </a:prstGeom>
+          <a:noFill/>
+          <a:ln>
+            <a:noFill/>
+          </a:ln>
+        </p:spPr>
+        <p:txBody>
+          <a:bodyPr lIns="91425" tIns="45700" rIns="91425" bIns="45700" anchor="t" anchorCtr="0">
+            <a:noAutofit/>
+          </a:bodyPr>
+          <a:lstStyle/>
+          <a:p>
+            <a:pPr marL="0" marR="0" lvl="0" indent="0" algn="l" rtl="0">
+              <a:spcBef>
+                <a:spcPts val="0"/>
+              </a:spcBef>
+              <a:buSzPct val="25000"/>
+              <a:buNone/>
+            </a:pPr>
+            <a:r>
+              <a:rPr lang="en-US" sz="4000" dirty="0" smtClean="0">
+                <a:solidFill>
+                  <a:srgbClr val="FFFF66"/>
+                </a:solidFill>
+                <a:latin typeface="Gill Sans MT"/>
+                <a:ea typeface="Gill Sans MT"/>
+                <a:cs typeface="Gill Sans MT"/>
+                <a:sym typeface="Gill Sans MT"/>
+              </a:rPr>
+              <a:t>Questions for you:</a:t>
+            </a:r>
+          </a:p>
+          <a:p>
+            <a:pPr marL="0" marR="0" lvl="0" indent="0" algn="l" rtl="0">
+              <a:spcBef>
+                <a:spcPts val="0"/>
+              </a:spcBef>
+              <a:buSzPct val="25000"/>
+              <a:buNone/>
+            </a:pPr>
+            <a:endParaRPr lang="en-US" sz="4000" dirty="0" smtClean="0">
+              <a:solidFill>
+                <a:srgbClr val="FFFF66"/>
+              </a:solidFill>
+              <a:latin typeface="Gill Sans MT"/>
+              <a:ea typeface="Gill Sans MT"/>
+              <a:cs typeface="Gill Sans MT"/>
+              <a:sym typeface="Gill Sans MT"/>
+            </a:endParaRPr>
+          </a:p>
+          <a:p>
+            <a:pPr marL="0" marR="0" lvl="0" indent="0" algn="l" rtl="0">
+              <a:spcBef>
+                <a:spcPts val="0"/>
+              </a:spcBef>
+              <a:buSzPct val="25000"/>
+              <a:buNone/>
+            </a:pPr>
+            <a:r>
+              <a:rPr lang="en-US" sz="4000" dirty="0" smtClean="0">
+                <a:solidFill>
+                  <a:srgbClr val="FFFF66"/>
+                </a:solidFill>
+                <a:latin typeface="Gill Sans MT"/>
+                <a:ea typeface="Gill Sans MT"/>
+                <a:cs typeface="Gill Sans MT"/>
+                <a:sym typeface="Gill Sans MT"/>
+              </a:rPr>
+              <a:t>Worth doing two years?</a:t>
+            </a:r>
+          </a:p>
+          <a:p>
+            <a:pPr marL="0" marR="0" lvl="0" indent="0" algn="l" rtl="0">
+              <a:spcBef>
+                <a:spcPts val="0"/>
+              </a:spcBef>
+              <a:buSzPct val="25000"/>
+              <a:buNone/>
+            </a:pPr>
+            <a:r>
+              <a:rPr lang="en-US" sz="4000" dirty="0" smtClean="0">
+                <a:solidFill>
+                  <a:srgbClr val="FFFF66"/>
+                </a:solidFill>
+                <a:latin typeface="Gill Sans MT"/>
+                <a:ea typeface="Gill Sans MT"/>
+                <a:cs typeface="Gill Sans MT"/>
+                <a:sym typeface="Gill Sans MT"/>
+              </a:rPr>
+              <a:t>Compactness and election results</a:t>
+            </a:r>
+          </a:p>
+          <a:p>
+            <a:pPr marL="0" marR="0" lvl="0" indent="0" algn="l" rtl="0">
+              <a:spcBef>
+                <a:spcPts val="0"/>
+              </a:spcBef>
+              <a:buSzPct val="25000"/>
+              <a:buNone/>
+            </a:pPr>
+            <a:r>
+              <a:rPr lang="en-US" sz="4000" dirty="0" smtClean="0">
+                <a:solidFill>
+                  <a:srgbClr val="FFFF66"/>
+                </a:solidFill>
+                <a:latin typeface="Gill Sans MT"/>
+                <a:ea typeface="Gill Sans MT"/>
+                <a:cs typeface="Gill Sans MT"/>
+                <a:sym typeface="Gill Sans MT"/>
+              </a:rPr>
+              <a:t>Criteria for eligible state?</a:t>
+            </a:r>
+          </a:p>
+          <a:p>
+            <a:pPr marL="0" marR="0" lvl="0" indent="0" algn="l" rtl="0">
+              <a:spcBef>
+                <a:spcPts val="0"/>
+              </a:spcBef>
+              <a:buSzPct val="25000"/>
+              <a:buNone/>
+            </a:pPr>
+            <a:endParaRPr lang="en-US" sz="4000" dirty="0">
+              <a:solidFill>
+                <a:srgbClr val="FFFF66"/>
+              </a:solidFill>
+              <a:latin typeface="Gill Sans MT"/>
+              <a:ea typeface="Gill Sans MT"/>
+              <a:cs typeface="Gill Sans MT"/>
+              <a:sym typeface="Gill Sans MT"/>
+            </a:endParaRPr>
+          </a:p>
+          <a:p>
+            <a:pPr marL="0" marR="0" lvl="0" indent="0" algn="l" rtl="0">
+              <a:spcBef>
+                <a:spcPts val="0"/>
+              </a:spcBef>
+              <a:buSzPct val="25000"/>
+              <a:buNone/>
+            </a:pPr>
+            <a:endParaRPr lang="en-US" sz="4000" dirty="0" smtClean="0">
+              <a:solidFill>
+                <a:srgbClr val="FFFF66"/>
+              </a:solidFill>
+              <a:latin typeface="Gill Sans MT"/>
+              <a:ea typeface="Gill Sans MT"/>
+              <a:cs typeface="Gill Sans MT"/>
+              <a:sym typeface="Gill Sans MT"/>
+            </a:endParaRPr>
+          </a:p>
+        </p:txBody>
+      </p:sp>
+    </p:spTree>
+    <p:extLst>
+      <p:ext uri="{BB962C8B-B14F-4D97-AF65-F5344CB8AC3E}">
+        <p14:creationId xmlns:p14="http://schemas.microsoft.com/office/powerpoint/2010/main" val="2534522961"/>
+      </p:ext>
+    </p:extLst>
+  </p:cSld>
+  <p:clrMapOvr>
+    <a:masterClrMapping/>
+  </p:clrMapOvr>
+</p:sld>
+</file>
+
 <file path=ppt/slides/slide3.xml><?xml version="1.0" encoding="utf-8"?>
 <p:sld xmlns:a="http://schemas.openxmlformats.org/drawingml/2006/main" xmlns:r="http://schemas.openxmlformats.org/officeDocument/2006/relationships" xmlns:p="http://schemas.openxmlformats.org/presentationml/2006/main">
   <p:cSld>

</xml_diff>